<commit_message>
Quick solution: Try using e-neutrons for this exercise
</commit_message>
<xml_diff>
--- a/CSNS_March_2019/4_Thursday_March_28th/4_SANS/SANS.pptx
+++ b/CSNS_March_2019/4_Thursday_March_28th/4_SANS/SANS.pptx
@@ -16,6 +16,7 @@
     <p:sldId id="261" r:id="rId13"/>
     <p:sldId id="262" r:id="rId14"/>
     <p:sldId id="263" r:id="rId15"/>
+    <p:sldId id="264" r:id="rId16"/>
   </p:sldIdLst>
   <p:sldSz cx="12179300" cy="6858000"/>
   <p:notesSz cx="6858000" cy="9144000"/>
@@ -16650,8 +16651,8 @@
         </p:blipFill>
         <p:spPr>
           <a:xfrm>
-            <a:off x="6999556" y="3385169"/>
-            <a:ext cx="3099802" cy="1193673"/>
+            <a:off x="6999556" y="3385170"/>
+            <a:ext cx="3099802" cy="1193672"/>
           </a:xfrm>
           <a:prstGeom prst="rect">
             <a:avLst/>
@@ -16863,8 +16864,8 @@
         </p:nvSpPr>
         <p:spPr>
           <a:xfrm>
-            <a:off x="2639043" y="1509509"/>
-            <a:ext cx="4807260" cy="4817644"/>
+            <a:off x="2639042" y="1509509"/>
+            <a:ext cx="4807261" cy="4817644"/>
           </a:xfrm>
           <a:prstGeom prst="rect">
             <a:avLst/>
@@ -18010,6 +18011,215 @@
           </a:ln>
         </p:spPr>
       </p:pic>
+    </p:spTree>
+  </p:cSld>
+  <p:clrMapOvr>
+    <a:masterClrMapping/>
+  </p:clrMapOvr>
+  <p:transition xmlns:p14="http://schemas.microsoft.com/office/powerpoint/2010/main" spd="med" advClick="1"/>
+</p:sld>
+</file>
+
+<file path=ppt/slides/slide9.xml><?xml version="1.0" encoding="utf-8"?>
+<p:sld xmlns:a="http://schemas.openxmlformats.org/drawingml/2006/main" xmlns:r="http://schemas.openxmlformats.org/officeDocument/2006/relationships" xmlns:p="http://schemas.openxmlformats.org/presentationml/2006/main" xmlns:m="http://schemas.openxmlformats.org/officeDocument/2006/math" xmlns:a14="http://schemas.microsoft.com/office/drawing/2010/main" showMasterSp="1" showMasterPhAnim="1">
+  <p:cSld>
+    <p:spTree>
+      <p:nvGrpSpPr>
+        <p:cNvPr id="1" name=""/>
+        <p:cNvGrpSpPr/>
+        <p:nvPr/>
+      </p:nvGrpSpPr>
+      <p:grpSpPr>
+        <a:xfrm>
+          <a:off x="0" y="0"/>
+          <a:ext cx="0" cy="0"/>
+          <a:chOff x="0" y="0"/>
+          <a:chExt cx="0" cy="0"/>
+        </a:xfrm>
+      </p:grpSpPr>
+      <p:sp>
+        <p:nvSpPr>
+          <p:cNvPr id="288" name="First exercise will take place on the e-neutrons.org infrastructure (using a web-simulator)"/>
+          <p:cNvSpPr txBox="1"/>
+          <p:nvPr>
+            <p:ph type="title"/>
+          </p:nvPr>
+        </p:nvSpPr>
+        <p:spPr>
+          <a:xfrm>
+            <a:off x="1715256" y="866199"/>
+            <a:ext cx="9312375" cy="972717"/>
+          </a:xfrm>
+          <a:prstGeom prst="rect">
+            <a:avLst/>
+          </a:prstGeom>
+        </p:spPr>
+        <p:txBody>
+          <a:bodyPr/>
+          <a:lstStyle/>
+          <a:p>
+            <a:pPr/>
+            <a:r>
+              <a:t>First exercise will take place on the </a:t>
+            </a:r>
+            <a:r>
+              <a:rPr u="sng">
+                <a:solidFill>
+                  <a:schemeClr val="accent2"/>
+                </a:solidFill>
+                <a:uFill>
+                  <a:solidFill>
+                    <a:schemeClr val="accent2"/>
+                  </a:solidFill>
+                </a:uFill>
+                <a:hlinkClick r:id="rId2" invalidUrl="" action="" tgtFrame="" tooltip="" history="1" highlightClick="0" endSnd="0"/>
+              </a:rPr>
+              <a:t>e-neutrons.org</a:t>
+            </a:r>
+            <a:r>
+              <a:t> infrastructure (using a web-simulator)</a:t>
+            </a:r>
+          </a:p>
+        </p:txBody>
+      </p:sp>
+      <p:sp>
+        <p:nvSpPr>
+          <p:cNvPr id="289" name="Slide Number"/>
+          <p:cNvSpPr txBox="1"/>
+          <p:nvPr>
+            <p:ph type="sldNum" sz="quarter" idx="2"/>
+          </p:nvPr>
+        </p:nvSpPr>
+        <p:spPr>
+          <a:prstGeom prst="rect">
+            <a:avLst/>
+          </a:prstGeom>
+          <a:extLst>
+            <a:ext uri="{C572A759-6A51-4108-AA02-DFA0A04FC94B}">
+              <ma14:wrappingTextBoxFlag xmlns:ma14="http://schemas.microsoft.com/office/mac/drawingml/2011/main" val="1"/>
+            </a:ext>
+          </a:extLst>
+        </p:spPr>
+        <p:txBody>
+          <a:bodyPr/>
+          <a:lstStyle/>
+          <a:p>
+            <a:pPr/>
+            <a:fld id="{86CB4B4D-7CA3-9044-876B-883B54F8677D}" type="slidenum"/>
+          </a:p>
+        </p:txBody>
+      </p:sp>
+      <p:sp>
+        <p:nvSpPr>
+          <p:cNvPr id="290" name="Please fill in the form at https://www.e-neutrons.org/?page_id=423…"/>
+          <p:cNvSpPr txBox="1"/>
+          <p:nvPr/>
+        </p:nvSpPr>
+        <p:spPr>
+          <a:xfrm>
+            <a:off x="2780779" y="2235683"/>
+            <a:ext cx="6275268" cy="2767034"/>
+          </a:xfrm>
+          <a:prstGeom prst="rect">
+            <a:avLst/>
+          </a:prstGeom>
+          <a:ln w="12700">
+            <a:miter lim="400000"/>
+          </a:ln>
+          <a:extLst>
+            <a:ext uri="{C572A759-6A51-4108-AA02-DFA0A04FC94B}">
+              <ma14:wrappingTextBoxFlag xmlns:ma14="http://schemas.microsoft.com/office/mac/drawingml/2011/main" val="1"/>
+            </a:ext>
+          </a:extLst>
+        </p:spPr>
+        <p:txBody>
+          <a:bodyPr wrap="none" lIns="0" tIns="0" rIns="0" bIns="0">
+            <a:spAutoFit/>
+          </a:bodyPr>
+          <a:lstStyle/>
+          <a:p>
+            <a:pPr marL="213894" indent="-213894">
+              <a:buSzPct val="100000"/>
+              <a:buAutoNum type="arabicPeriod" startAt="1"/>
+            </a:pPr>
+            <a:r>
+              <a:t> Please fill in the form at </a:t>
+            </a:r>
+            <a:r>
+              <a:rPr u="sng">
+                <a:solidFill>
+                  <a:schemeClr val="accent2"/>
+                </a:solidFill>
+                <a:uFill>
+                  <a:solidFill>
+                    <a:schemeClr val="accent2"/>
+                  </a:solidFill>
+                </a:uFill>
+                <a:hlinkClick r:id="rId3" invalidUrl="" action="" tgtFrame="" tooltip="" history="1" highlightClick="0" endSnd="0"/>
+              </a:rPr>
+              <a:t>https://www.e-neutrons.org/?page_id=423</a:t>
+            </a:r>
+            <a:r>
+              <a:t> </a:t>
+            </a:r>
+            <a:br/>
+          </a:p>
+          <a:p>
+            <a:pPr marL="213894" indent="-213894">
+              <a:buSzPct val="100000"/>
+              <a:buAutoNum type="arabicPeriod" startAt="1"/>
+            </a:pPr>
+            <a:r>
+              <a:t> (Once everyone has done this, I will enable the accounts)</a:t>
+            </a:r>
+            <a:br/>
+          </a:p>
+          <a:p>
+            <a:pPr marL="213894" indent="-213894">
+              <a:buSzPct val="100000"/>
+              <a:buAutoNum type="arabicPeriod" startAt="1"/>
+            </a:pPr>
+            <a:r>
+              <a:t> You will receive an email with login-credentials</a:t>
+            </a:r>
+            <a:br/>
+          </a:p>
+          <a:p>
+            <a:pPr marL="213894" indent="-213894">
+              <a:buSzPct val="100000"/>
+              <a:buAutoNum type="arabicPeriod" startAt="1"/>
+            </a:pPr>
+            <a:r>
+              <a:t> Use these credentials to log in to the simulation quiz at</a:t>
+            </a:r>
+            <a:br/>
+            <a:r>
+              <a:rPr u="sng">
+                <a:solidFill>
+                  <a:schemeClr val="accent2"/>
+                </a:solidFill>
+                <a:uFill>
+                  <a:solidFill>
+                    <a:schemeClr val="accent2"/>
+                  </a:solidFill>
+                </a:uFill>
+                <a:hlinkClick r:id="rId4" invalidUrl="" action="" tgtFrame="" tooltip="" history="1" highlightClick="0" endSnd="0"/>
+              </a:rPr>
+              <a:t>https://www.e-neutrons.org/moodle/mod/quiz/view.php?id=4276</a:t>
+            </a:r>
+            <a:br/>
+          </a:p>
+          <a:p>
+            <a:pPr marL="213894" indent="-213894">
+              <a:buSzPct val="100000"/>
+              <a:buAutoNum type="arabicPeriod" startAt="1"/>
+            </a:pPr>
+            <a:r>
+              <a:t>Follow the instructions in the quiz</a:t>
+            </a:r>
+          </a:p>
+        </p:txBody>
+      </p:sp>
     </p:spTree>
   </p:cSld>
   <p:clrMapOvr>

</xml_diff>